<commit_message>
Business Rules and ERD
</commit_message>
<xml_diff>
--- a/Presentation/Database Assignment.pptx
+++ b/Presentation/Database Assignment.pptx
@@ -5,19 +5,21 @@
     <p:sldMasterId id="2147483648" r:id="rId1"/>
   </p:sldMasterIdLst>
   <p:notesMasterIdLst>
-    <p:notesMasterId r:id="rId10"/>
+    <p:notesMasterId r:id="rId12"/>
   </p:notesMasterIdLst>
   <p:handoutMasterIdLst>
-    <p:handoutMasterId r:id="rId11"/>
+    <p:handoutMasterId r:id="rId13"/>
   </p:handoutMasterIdLst>
   <p:sldIdLst>
     <p:sldId id="280" r:id="rId3"/>
-    <p:sldId id="312" r:id="rId4"/>
-    <p:sldId id="311" r:id="rId5"/>
-    <p:sldId id="310" r:id="rId6"/>
-    <p:sldId id="313" r:id="rId7"/>
-    <p:sldId id="269" r:id="rId8"/>
-    <p:sldId id="309" r:id="rId9"/>
+    <p:sldId id="318" r:id="rId4"/>
+    <p:sldId id="321" r:id="rId5"/>
+    <p:sldId id="312" r:id="rId6"/>
+    <p:sldId id="311" r:id="rId7"/>
+    <p:sldId id="310" r:id="rId8"/>
+    <p:sldId id="313" r:id="rId9"/>
+    <p:sldId id="269" r:id="rId10"/>
+    <p:sldId id="309" r:id="rId11"/>
   </p:sldIdLst>
   <p:sldSz cx="12192000" cy="6858000"/>
   <p:notesSz cx="6858000" cy="9144000"/>
@@ -4096,7 +4098,7 @@
           </a:schemeClr>
         </a:buClr>
         <a:buSzPct val="85000"/>
-        <a:buFont typeface="Wingdings 2"/>
+        <a:buFont typeface="Wingdings 2" panose="05020102010507070707"/>
         <a:buChar char=""/>
         <a:defRPr kumimoji="0" sz="2600" kern="1200">
           <a:solidFill>
@@ -4117,7 +4119,7 @@
           </a:schemeClr>
         </a:buClr>
         <a:buSzPct val="85000"/>
-        <a:buFont typeface="Wingdings 2"/>
+        <a:buFont typeface="Wingdings 2" panose="05020102010507070707"/>
         <a:buChar char=""/>
         <a:defRPr kumimoji="0" sz="2400" kern="1200">
           <a:solidFill>
@@ -4139,7 +4141,7 @@
           </a:schemeClr>
         </a:buClr>
         <a:buSzPct val="85000"/>
-        <a:buFont typeface="Wingdings 2"/>
+        <a:buFont typeface="Wingdings 2" panose="05020102010507070707"/>
         <a:buChar char=""/>
         <a:defRPr kumimoji="0" sz="2000" kern="1200">
           <a:solidFill>
@@ -4158,7 +4160,7 @@
           <a:schemeClr val="accent3"/>
         </a:buClr>
         <a:buSzPct val="80000"/>
-        <a:buFont typeface="Wingdings 2"/>
+        <a:buFont typeface="Wingdings 2" panose="05020102010507070707"/>
         <a:buChar char=""/>
         <a:defRPr kumimoji="0" sz="2000" kern="1200">
           <a:solidFill>
@@ -4455,7 +4457,7 @@
       <p:grpSpPr/>
       <p:sp>
         <p:nvSpPr>
-          <p:cNvPr id="2" name="Title 1"/>
+          <p:cNvPr id="5" name="Title 4"/>
           <p:cNvSpPr>
             <a:spLocks noGrp="1"/>
           </p:cNvSpPr>
@@ -4465,8 +4467,8 @@
         </p:nvSpPr>
         <p:spPr>
           <a:xfrm>
-            <a:off x="914400" y="2088833"/>
-            <a:ext cx="10363200" cy="1143000"/>
+            <a:off x="4284980" y="356870"/>
+            <a:ext cx="3622675" cy="725805"/>
           </a:xfrm>
         </p:spPr>
         <p:txBody>
@@ -4474,15 +4476,208 @@
           <a:p>
             <a:pPr algn="ctr"/>
             <a:r>
-              <a:rPr lang="en-US">
+              <a:rPr lang="en-MY" altLang="en-US" sz="3200" b="1">
                 <a:latin typeface="Times New Roman" panose="02020603050405020304" charset="0"/>
                 <a:cs typeface="Times New Roman" panose="02020603050405020304" charset="0"/>
               </a:rPr>
-              <a:t>Organization Structure</a:t>
-            </a:r>
-            <a:endParaRPr lang="en-US">
+              <a:t>Business Rules</a:t>
+            </a:r>
+            <a:endParaRPr lang="en-MY" altLang="en-US" sz="3200" b="1">
               <a:latin typeface="Times New Roman" panose="02020603050405020304" charset="0"/>
               <a:cs typeface="Times New Roman" panose="02020603050405020304" charset="0"/>
+            </a:endParaRPr>
+          </a:p>
+        </p:txBody>
+      </p:sp>
+      <p:sp>
+        <p:nvSpPr>
+          <p:cNvPr id="7" name="Text Box 6"/>
+          <p:cNvSpPr txBox="1"/>
+          <p:nvPr/>
+        </p:nvSpPr>
+        <p:spPr>
+          <a:xfrm>
+            <a:off x="1165225" y="1082358"/>
+            <a:ext cx="9860915" cy="3322955"/>
+          </a:xfrm>
+          <a:prstGeom prst="rect">
+            <a:avLst/>
+          </a:prstGeom>
+          <a:noFill/>
+          <a:ln>
+            <a:noFill/>
+          </a:ln>
+        </p:spPr>
+        <p:txBody>
+          <a:bodyPr wrap="square" rtlCol="0" anchor="ctr" anchorCtr="1">
+            <a:spAutoFit/>
+          </a:bodyPr>
+          <a:p>
+            <a:pPr marL="342900" indent="-342900">
+              <a:lnSpc>
+                <a:spcPct val="175000"/>
+              </a:lnSpc>
+              <a:spcBef>
+                <a:spcPts val="0"/>
+              </a:spcBef>
+              <a:spcAft>
+                <a:spcPts val="0"/>
+              </a:spcAft>
+              <a:buFont typeface="Arial" panose="020B0604020202020204" pitchFamily="34" charset="0"/>
+              <a:buChar char="•"/>
+            </a:pPr>
+            <a:r>
+              <a:rPr lang="en-MY" altLang="en-US" sz="2000">
+                <a:latin typeface="Times New Roman" panose="02020603050405020304" charset="0"/>
+                <a:cs typeface="Times New Roman" panose="02020603050405020304" charset="0"/>
+                <a:sym typeface="+mn-ea"/>
+              </a:rPr>
+              <a:t>An account can reserve many books. A book reservation belongs to only one account.</a:t>
+            </a:r>
+            <a:endParaRPr lang="en-MY" altLang="en-US" sz="2000">
+              <a:latin typeface="Times New Roman" panose="02020603050405020304" charset="0"/>
+              <a:cs typeface="Times New Roman" panose="02020603050405020304" charset="0"/>
+              <a:sym typeface="+mn-ea"/>
+            </a:endParaRPr>
+          </a:p>
+          <a:p>
+            <a:pPr marL="342900" indent="-342900">
+              <a:lnSpc>
+                <a:spcPct val="175000"/>
+              </a:lnSpc>
+              <a:spcBef>
+                <a:spcPts val="0"/>
+              </a:spcBef>
+              <a:spcAft>
+                <a:spcPts val="0"/>
+              </a:spcAft>
+              <a:buFont typeface="Arial" panose="020B0604020202020204" pitchFamily="34" charset="0"/>
+              <a:buChar char="•"/>
+            </a:pPr>
+            <a:r>
+              <a:rPr lang="en-MY" altLang="en-US" sz="2000">
+                <a:latin typeface="Times New Roman" panose="02020603050405020304" charset="0"/>
+                <a:cs typeface="Times New Roman" panose="02020603050405020304" charset="0"/>
+                <a:sym typeface="+mn-ea"/>
+              </a:rPr>
+              <a:t>An account can make payment on many fine. A fine can only be paid by one account.</a:t>
+            </a:r>
+            <a:endParaRPr lang="en-MY" altLang="en-US" sz="2000">
+              <a:latin typeface="Times New Roman" panose="02020603050405020304" charset="0"/>
+              <a:cs typeface="Times New Roman" panose="02020603050405020304" charset="0"/>
+              <a:sym typeface="+mn-ea"/>
+            </a:endParaRPr>
+          </a:p>
+          <a:p>
+            <a:pPr marL="342900" indent="-342900">
+              <a:lnSpc>
+                <a:spcPct val="175000"/>
+              </a:lnSpc>
+              <a:spcBef>
+                <a:spcPts val="0"/>
+              </a:spcBef>
+              <a:spcAft>
+                <a:spcPts val="0"/>
+              </a:spcAft>
+              <a:buFont typeface="Arial" panose="020B0604020202020204" pitchFamily="34" charset="0"/>
+              <a:buChar char="•"/>
+            </a:pPr>
+            <a:r>
+              <a:rPr lang="en-MY" altLang="en-US" sz="2000">
+                <a:latin typeface="Times New Roman" panose="02020603050405020304" charset="0"/>
+                <a:cs typeface="Times New Roman" panose="02020603050405020304" charset="0"/>
+                <a:sym typeface="+mn-ea"/>
+              </a:rPr>
+              <a:t>A book reservation can reserve many books. A book can be reserved by many books.</a:t>
+            </a:r>
+            <a:endParaRPr lang="en-MY" altLang="en-US" sz="2000">
+              <a:latin typeface="Times New Roman" panose="02020603050405020304" charset="0"/>
+              <a:cs typeface="Times New Roman" panose="02020603050405020304" charset="0"/>
+              <a:sym typeface="+mn-ea"/>
+            </a:endParaRPr>
+          </a:p>
+          <a:p>
+            <a:pPr marL="342900" indent="-342900">
+              <a:lnSpc>
+                <a:spcPct val="175000"/>
+              </a:lnSpc>
+              <a:spcBef>
+                <a:spcPts val="0"/>
+              </a:spcBef>
+              <a:spcAft>
+                <a:spcPts val="0"/>
+              </a:spcAft>
+              <a:buFont typeface="Arial" panose="020B0604020202020204" pitchFamily="34" charset="0"/>
+              <a:buChar char="•"/>
+            </a:pPr>
+            <a:r>
+              <a:rPr lang="en-MY" altLang="en-US" sz="2000">
+                <a:latin typeface="Times New Roman" panose="02020603050405020304" charset="0"/>
+                <a:cs typeface="Times New Roman" panose="02020603050405020304" charset="0"/>
+                <a:sym typeface="+mn-ea"/>
+              </a:rPr>
+              <a:t>A book reservation can have one or no fine. A fine only belongs to a book reservation.</a:t>
+            </a:r>
+            <a:endParaRPr lang="en-MY" altLang="en-US" sz="2000">
+              <a:latin typeface="Times New Roman" panose="02020603050405020304" charset="0"/>
+              <a:cs typeface="Times New Roman" panose="02020603050405020304" charset="0"/>
+              <a:sym typeface="+mn-ea"/>
+            </a:endParaRPr>
+          </a:p>
+          <a:p>
+            <a:pPr marL="342900" indent="-342900">
+              <a:lnSpc>
+                <a:spcPct val="175000"/>
+              </a:lnSpc>
+              <a:spcBef>
+                <a:spcPts val="0"/>
+              </a:spcBef>
+              <a:spcAft>
+                <a:spcPts val="0"/>
+              </a:spcAft>
+              <a:buFont typeface="Arial" panose="020B0604020202020204" pitchFamily="34" charset="0"/>
+              <a:buChar char="•"/>
+            </a:pPr>
+            <a:r>
+              <a:rPr lang="en-MY" altLang="en-US" sz="2000">
+                <a:latin typeface="Times New Roman" panose="02020603050405020304" charset="0"/>
+                <a:cs typeface="Times New Roman" panose="02020603050405020304" charset="0"/>
+                <a:sym typeface="+mn-ea"/>
+              </a:rPr>
+              <a:t>A report obtains all information from payment record.</a:t>
+            </a:r>
+            <a:endParaRPr lang="en-MY" altLang="en-US" sz="2000">
+              <a:latin typeface="Times New Roman" panose="02020603050405020304" charset="0"/>
+              <a:cs typeface="Times New Roman" panose="02020603050405020304" charset="0"/>
+              <a:sym typeface="+mn-ea"/>
+            </a:endParaRPr>
+          </a:p>
+          <a:p>
+            <a:pPr marL="342900" indent="-342900">
+              <a:lnSpc>
+                <a:spcPct val="175000"/>
+              </a:lnSpc>
+              <a:spcBef>
+                <a:spcPts val="0"/>
+              </a:spcBef>
+              <a:spcAft>
+                <a:spcPts val="0"/>
+              </a:spcAft>
+              <a:buFont typeface="Arial" panose="020B0604020202020204" pitchFamily="34" charset="0"/>
+              <a:buChar char="•"/>
+            </a:pPr>
+            <a:r>
+              <a:rPr lang="en-MY" altLang="en-US" sz="2000">
+                <a:latin typeface="Times New Roman" panose="02020603050405020304" charset="0"/>
+                <a:cs typeface="Times New Roman" panose="02020603050405020304" charset="0"/>
+                <a:sym typeface="+mn-ea"/>
+              </a:rPr>
+              <a:t>A report obtains all information from book reservation record.</a:t>
+            </a:r>
+            <a:endParaRPr lang="en-MY" altLang="en-US" sz="2000">
+              <a:latin typeface="Times New Roman" panose="02020603050405020304" charset="0"/>
+              <a:cs typeface="Times New Roman" panose="02020603050405020304" charset="0"/>
+              <a:sym typeface="+mn-ea"/>
             </a:endParaRPr>
           </a:p>
         </p:txBody>
@@ -4519,39 +4714,28 @@
       <p:grpSpPr/>
       <p:pic>
         <p:nvPicPr>
-          <p:cNvPr id="4" name="Picture 1"/>
+          <p:cNvPr id="4" name="Content Placeholder 3" descr="task 3"/>
           <p:cNvPicPr>
-            <a:picLocks noChangeAspect="1" noChangeArrowheads="1"/>
+            <a:picLocks noChangeAspect="1"/>
           </p:cNvPicPr>
           <p:nvPr>
             <p:ph sz="quarter" idx="1"/>
           </p:nvPr>
         </p:nvPicPr>
         <p:blipFill>
-          <a:blip r:embed="rId1">
-            <a:extLst>
-              <a:ext uri="{28A0092B-C50C-407E-A947-70E740481C1C}">
-                <a14:useLocalDpi xmlns:a14="http://schemas.microsoft.com/office/drawing/2010/main" val="0"/>
-              </a:ext>
-            </a:extLst>
-          </a:blip>
-          <a:srcRect/>
+          <a:blip r:embed="rId1"/>
           <a:stretch>
             <a:fillRect/>
           </a:stretch>
         </p:blipFill>
         <p:spPr>
           <a:xfrm>
-            <a:off x="-52705" y="95250"/>
-            <a:ext cx="12124055" cy="6523990"/>
+            <a:off x="876935" y="160655"/>
+            <a:ext cx="10438130" cy="6536055"/>
           </a:xfrm>
           <a:prstGeom prst="rect">
             <a:avLst/>
           </a:prstGeom>
-          <a:noFill/>
-          <a:ln>
-            <a:noFill/>
-          </a:ln>
         </p:spPr>
       </p:pic>
     </p:spTree>
@@ -4596,7 +4780,7 @@
         </p:nvSpPr>
         <p:spPr>
           <a:xfrm>
-            <a:off x="914400" y="2429828"/>
+            <a:off x="914400" y="2088833"/>
             <a:ext cx="10363200" cy="1143000"/>
           </a:xfrm>
         </p:spPr>
@@ -4605,10 +4789,16 @@
           <a:p>
             <a:pPr algn="ctr"/>
             <a:r>
-              <a:rPr lang="en-US"/>
-              <a:t>Functional Diagram</a:t>
-            </a:r>
-            <a:endParaRPr lang="en-US"/>
+              <a:rPr lang="en-US">
+                <a:latin typeface="Times New Roman" panose="02020603050405020304" charset="0"/>
+                <a:cs typeface="Times New Roman" panose="02020603050405020304" charset="0"/>
+              </a:rPr>
+              <a:t>Organization Structure</a:t>
+            </a:r>
+            <a:endParaRPr lang="en-US">
+              <a:latin typeface="Times New Roman" panose="02020603050405020304" charset="0"/>
+              <a:cs typeface="Times New Roman" panose="02020603050405020304" charset="0"/>
+            </a:endParaRPr>
           </a:p>
         </p:txBody>
       </p:sp>
@@ -4644,28 +4834,39 @@
       <p:grpSpPr/>
       <p:pic>
         <p:nvPicPr>
-          <p:cNvPr id="4" name="Content Placeholder 3" descr="FunctionalDiagram"/>
+          <p:cNvPr id="4" name="Picture 1"/>
           <p:cNvPicPr>
-            <a:picLocks noChangeAspect="1"/>
+            <a:picLocks noChangeAspect="1" noChangeArrowheads="1"/>
           </p:cNvPicPr>
           <p:nvPr>
             <p:ph sz="quarter" idx="1"/>
           </p:nvPr>
         </p:nvPicPr>
         <p:blipFill>
-          <a:blip r:embed="rId1"/>
+          <a:blip r:embed="rId1">
+            <a:extLst>
+              <a:ext uri="{28A0092B-C50C-407E-A947-70E740481C1C}">
+                <a14:useLocalDpi xmlns:a14="http://schemas.microsoft.com/office/drawing/2010/main" val="0"/>
+              </a:ext>
+            </a:extLst>
+          </a:blip>
+          <a:srcRect/>
           <a:stretch>
             <a:fillRect/>
           </a:stretch>
         </p:blipFill>
         <p:spPr>
           <a:xfrm>
-            <a:off x="44450" y="103505"/>
-            <a:ext cx="11913870" cy="6604635"/>
+            <a:off x="-52705" y="95250"/>
+            <a:ext cx="12124055" cy="6523990"/>
           </a:xfrm>
           <a:prstGeom prst="rect">
             <a:avLst/>
           </a:prstGeom>
+          <a:noFill/>
+          <a:ln>
+            <a:noFill/>
+          </a:ln>
         </p:spPr>
       </p:pic>
     </p:spTree>
@@ -4697,6 +4898,120 @@
         <p:cNvGrpSpPr/>
         <p:nvPr/>
       </p:nvGrpSpPr>
+      <p:grpSpPr/>
+      <p:sp>
+        <p:nvSpPr>
+          <p:cNvPr id="2" name="Title 1"/>
+          <p:cNvSpPr>
+            <a:spLocks noGrp="1"/>
+          </p:cNvSpPr>
+          <p:nvPr>
+            <p:ph type="title"/>
+          </p:nvPr>
+        </p:nvSpPr>
+        <p:spPr>
+          <a:xfrm>
+            <a:off x="914400" y="2429828"/>
+            <a:ext cx="10363200" cy="1143000"/>
+          </a:xfrm>
+        </p:spPr>
+        <p:txBody>
+          <a:bodyPr/>
+          <a:p>
+            <a:pPr algn="ctr"/>
+            <a:r>
+              <a:rPr lang="en-US"/>
+              <a:t>Functional Diagram</a:t>
+            </a:r>
+            <a:endParaRPr lang="en-US"/>
+          </a:p>
+        </p:txBody>
+      </p:sp>
+    </p:spTree>
+  </p:cSld>
+  <p:clrMapOvr>
+    <a:masterClrMapping/>
+  </p:clrMapOvr>
+  <mc:AlternateContent xmlns:mc="http://schemas.openxmlformats.org/markup-compatibility/2006">
+    <mc:Choice xmlns:p14="http://schemas.microsoft.com/office/powerpoint/2010/main" Requires="p14">
+      <p:transition spd="med" p14:dur="700">
+        <p:fade/>
+      </p:transition>
+    </mc:Choice>
+    <mc:Fallback>
+      <p:transition spd="med">
+        <p:fade/>
+      </p:transition>
+    </mc:Fallback>
+  </mc:AlternateContent>
+</p:sld>
+</file>
+
+<file path=ppt/slides/slide7.xml><?xml version="1.0" encoding="utf-8"?>
+<p:sld xmlns:a="http://schemas.openxmlformats.org/drawingml/2006/main" xmlns:r="http://schemas.openxmlformats.org/officeDocument/2006/relationships" xmlns:p="http://schemas.openxmlformats.org/presentationml/2006/main">
+  <p:cSld>
+    <p:spTree>
+      <p:nvGrpSpPr>
+        <p:cNvPr id="1" name=""/>
+        <p:cNvGrpSpPr/>
+        <p:nvPr/>
+      </p:nvGrpSpPr>
+      <p:grpSpPr/>
+      <p:pic>
+        <p:nvPicPr>
+          <p:cNvPr id="4" name="Content Placeholder 3" descr="FunctionalDiagram"/>
+          <p:cNvPicPr>
+            <a:picLocks noChangeAspect="1"/>
+          </p:cNvPicPr>
+          <p:nvPr>
+            <p:ph sz="quarter" idx="1"/>
+          </p:nvPr>
+        </p:nvPicPr>
+        <p:blipFill>
+          <a:blip r:embed="rId1"/>
+          <a:stretch>
+            <a:fillRect/>
+          </a:stretch>
+        </p:blipFill>
+        <p:spPr>
+          <a:xfrm>
+            <a:off x="44450" y="103505"/>
+            <a:ext cx="11913870" cy="6604635"/>
+          </a:xfrm>
+          <a:prstGeom prst="rect">
+            <a:avLst/>
+          </a:prstGeom>
+        </p:spPr>
+      </p:pic>
+    </p:spTree>
+  </p:cSld>
+  <p:clrMapOvr>
+    <a:masterClrMapping/>
+  </p:clrMapOvr>
+  <mc:AlternateContent xmlns:mc="http://schemas.openxmlformats.org/markup-compatibility/2006">
+    <mc:Choice xmlns:p14="http://schemas.microsoft.com/office/powerpoint/2010/main" Requires="p14">
+      <p:transition spd="med" p14:dur="700">
+        <p:fade/>
+      </p:transition>
+    </mc:Choice>
+    <mc:Fallback>
+      <p:transition spd="med">
+        <p:fade/>
+      </p:transition>
+    </mc:Fallback>
+  </mc:AlternateContent>
+</p:sld>
+</file>
+
+<file path=ppt/slides/slide8.xml><?xml version="1.0" encoding="utf-8"?>
+<p:sld xmlns:a="http://schemas.openxmlformats.org/drawingml/2006/main" xmlns:r="http://schemas.openxmlformats.org/officeDocument/2006/relationships" xmlns:p="http://schemas.openxmlformats.org/presentationml/2006/main">
+  <p:cSld>
+    <p:spTree>
+      <p:nvGrpSpPr>
+        <p:cNvPr id="1" name=""/>
+        <p:cNvGrpSpPr/>
+        <p:nvPr/>
+      </p:nvGrpSpPr>
       <p:grpSpPr>
         <a:xfrm>
           <a:off x="0" y="0"/>
@@ -4869,7 +5184,7 @@
                 </a:schemeClr>
               </a:buClr>
               <a:buSzPct val="85000"/>
-              <a:buFont typeface="Wingdings 2"/>
+              <a:buFont typeface="Wingdings 2" panose="05020102010507070707"/>
               <a:buChar char=""/>
               <a:defRPr kumimoji="0" sz="2600" kern="1200">
                 <a:solidFill>
@@ -4890,7 +5205,7 @@
                 </a:schemeClr>
               </a:buClr>
               <a:buSzPct val="85000"/>
-              <a:buFont typeface="Wingdings 2"/>
+              <a:buFont typeface="Wingdings 2" panose="05020102010507070707"/>
               <a:buChar char=""/>
               <a:defRPr kumimoji="0" sz="2400" kern="1200">
                 <a:solidFill>
@@ -4912,7 +5227,7 @@
                 </a:schemeClr>
               </a:buClr>
               <a:buSzPct val="85000"/>
-              <a:buFont typeface="Wingdings 2"/>
+              <a:buFont typeface="Wingdings 2" panose="05020102010507070707"/>
               <a:buChar char=""/>
               <a:defRPr kumimoji="0" sz="2000" kern="1200">
                 <a:solidFill>
@@ -4931,7 +5246,7 @@
                 <a:schemeClr val="accent3"/>
               </a:buClr>
               <a:buSzPct val="80000"/>
-              <a:buFont typeface="Wingdings 2"/>
+              <a:buFont typeface="Wingdings 2" panose="05020102010507070707"/>
               <a:buChar char=""/>
               <a:defRPr kumimoji="0" sz="2000" kern="1200">
                 <a:solidFill>
@@ -5070,7 +5385,7 @@
 </p:sld>
 </file>
 
-<file path=ppt/slides/slide7.xml><?xml version="1.0" encoding="utf-8"?>
+<file path=ppt/slides/slide9.xml><?xml version="1.0" encoding="utf-8"?>
 <p:sld xmlns:a="http://schemas.openxmlformats.org/drawingml/2006/main" xmlns:r="http://schemas.openxmlformats.org/officeDocument/2006/relationships" xmlns:p="http://schemas.openxmlformats.org/presentationml/2006/main">
   <p:cSld>
     <p:spTree>
@@ -5195,7 +5510,7 @@
                 </a:schemeClr>
               </a:buClr>
               <a:buSzPct val="85000"/>
-              <a:buFont typeface="Wingdings 2"/>
+              <a:buFont typeface="Wingdings 2" panose="05020102010507070707"/>
               <a:buChar char=""/>
               <a:defRPr kumimoji="0" sz="2600" kern="1200">
                 <a:solidFill>
@@ -5216,7 +5531,7 @@
                 </a:schemeClr>
               </a:buClr>
               <a:buSzPct val="85000"/>
-              <a:buFont typeface="Wingdings 2"/>
+              <a:buFont typeface="Wingdings 2" panose="05020102010507070707"/>
               <a:buChar char=""/>
               <a:defRPr kumimoji="0" sz="2400" kern="1200">
                 <a:solidFill>
@@ -5238,7 +5553,7 @@
                 </a:schemeClr>
               </a:buClr>
               <a:buSzPct val="85000"/>
-              <a:buFont typeface="Wingdings 2"/>
+              <a:buFont typeface="Wingdings 2" panose="05020102010507070707"/>
               <a:buChar char=""/>
               <a:defRPr kumimoji="0" sz="2000" kern="1200">
                 <a:solidFill>
@@ -5257,7 +5572,7 @@
                 <a:schemeClr val="accent3"/>
               </a:buClr>
               <a:buSzPct val="80000"/>
-              <a:buFont typeface="Wingdings 2"/>
+              <a:buFont typeface="Wingdings 2" panose="05020102010507070707"/>
               <a:buChar char=""/>
               <a:defRPr kumimoji="0" sz="2000" kern="1200">
                 <a:solidFill>

</xml_diff>